<commit_message>
add days 55 to 57
</commit_message>
<xml_diff>
--- a/_PowerPoints/2nd Semester/Unit 6 Probability and Stats/Algebra4_Day_053 11.1 Permutation and Combination.pptx
+++ b/_PowerPoints/2nd Semester/Unit 6 Probability and Stats/Algebra4_Day_053 11.1 Permutation and Combination.pptx
@@ -172,7 +172,7 @@
         </p:nvSpPr>
         <p:spPr>
           <a:xfrm>
-            <a:off x="0" y="1"/>
+            <a:off x="0" y="2"/>
             <a:ext cx="4028440" cy="351737"/>
           </a:xfrm>
           <a:prstGeom prst="rect">
@@ -203,7 +203,7 @@
         </p:nvSpPr>
         <p:spPr>
           <a:xfrm>
-            <a:off x="5265809" y="1"/>
+            <a:off x="5265809" y="2"/>
             <a:ext cx="4028440" cy="351737"/>
           </a:xfrm>
           <a:prstGeom prst="rect">
@@ -220,7 +220,7 @@
           <a:p>
             <a:fld id="{FAC4242D-6570-4D26-878C-5DE8AD62D39F}" type="datetimeFigureOut">
               <a:rPr lang="en-US" smtClean="0"/>
-              <a:t>2/14/2018</a:t>
+              <a:t>2/22/2018</a:t>
             </a:fld>
             <a:endParaRPr lang="en-US"/>
           </a:p>
@@ -473,7 +473,7 @@
             <a:fld id="{87DE6118-2437-4B30-8E3C-4D2BE6020583}" type="datetimeFigureOut">
               <a:rPr lang="en-US" dirty="0"/>
               <a:pPr/>
-              <a:t>2/14/2018</a:t>
+              <a:t>2/22/2018</a:t>
             </a:fld>
             <a:endParaRPr lang="en-US" dirty="0"/>
           </a:p>
@@ -799,7 +799,7 @@
           <a:p>
             <a:fld id="{87DE6118-2437-4B30-8E3C-4D2BE6020583}" type="datetimeFigureOut">
               <a:rPr lang="en-US" dirty="0"/>
-              <a:t>2/14/2018</a:t>
+              <a:t>2/22/2018</a:t>
             </a:fld>
             <a:endParaRPr lang="en-US" dirty="0"/>
           </a:p>
@@ -974,7 +974,7 @@
           <a:p>
             <a:fld id="{87DE6118-2437-4B30-8E3C-4D2BE6020583}" type="datetimeFigureOut">
               <a:rPr lang="en-US" dirty="0"/>
-              <a:t>2/14/2018</a:t>
+              <a:t>2/22/2018</a:t>
             </a:fld>
             <a:endParaRPr lang="en-US" dirty="0"/>
           </a:p>
@@ -1139,7 +1139,7 @@
           <a:p>
             <a:fld id="{87DE6118-2437-4B30-8E3C-4D2BE6020583}" type="datetimeFigureOut">
               <a:rPr lang="en-US" dirty="0"/>
-              <a:t>2/14/2018</a:t>
+              <a:t>2/22/2018</a:t>
             </a:fld>
             <a:endParaRPr lang="en-US" dirty="0"/>
           </a:p>
@@ -1412,7 +1412,7 @@
             <a:fld id="{87DE6118-2437-4B30-8E3C-4D2BE6020583}" type="datetimeFigureOut">
               <a:rPr lang="en-US" dirty="0"/>
               <a:pPr/>
-              <a:t>2/14/2018</a:t>
+              <a:t>2/22/2018</a:t>
             </a:fld>
             <a:endParaRPr lang="en-US" dirty="0"/>
           </a:p>
@@ -1802,7 +1802,7 @@
           <a:p>
             <a:fld id="{87DE6118-2437-4B30-8E3C-4D2BE6020583}" type="datetimeFigureOut">
               <a:rPr lang="en-US" dirty="0"/>
-              <a:t>2/14/2018</a:t>
+              <a:t>2/22/2018</a:t>
             </a:fld>
             <a:endParaRPr lang="en-US" dirty="0"/>
           </a:p>
@@ -2274,7 +2274,7 @@
           <a:p>
             <a:fld id="{87DE6118-2437-4B30-8E3C-4D2BE6020583}" type="datetimeFigureOut">
               <a:rPr lang="en-US" dirty="0"/>
-              <a:t>2/14/2018</a:t>
+              <a:t>2/22/2018</a:t>
             </a:fld>
             <a:endParaRPr lang="en-US" dirty="0"/>
           </a:p>
@@ -2387,7 +2387,7 @@
           <a:p>
             <a:fld id="{87DE6118-2437-4B30-8E3C-4D2BE6020583}" type="datetimeFigureOut">
               <a:rPr lang="en-US" dirty="0"/>
-              <a:t>2/14/2018</a:t>
+              <a:t>2/22/2018</a:t>
             </a:fld>
             <a:endParaRPr lang="en-US" dirty="0"/>
           </a:p>
@@ -2477,7 +2477,7 @@
           <a:p>
             <a:fld id="{87DE6118-2437-4B30-8E3C-4D2BE6020583}" type="datetimeFigureOut">
               <a:rPr lang="en-US" dirty="0"/>
-              <a:t>2/14/2018</a:t>
+              <a:t>2/22/2018</a:t>
             </a:fld>
             <a:endParaRPr lang="en-US" dirty="0"/>
           </a:p>
@@ -2819,7 +2819,7 @@
             <a:fld id="{87DE6118-2437-4B30-8E3C-4D2BE6020583}" type="datetimeFigureOut">
               <a:rPr lang="en-US" dirty="0"/>
               <a:pPr/>
-              <a:t>2/14/2018</a:t>
+              <a:t>2/22/2018</a:t>
             </a:fld>
             <a:endParaRPr lang="en-US" dirty="0"/>
           </a:p>
@@ -3204,7 +3204,7 @@
             <a:fld id="{87DE6118-2437-4B30-8E3C-4D2BE6020583}" type="datetimeFigureOut">
               <a:rPr lang="en-US" dirty="0"/>
               <a:pPr/>
-              <a:t>2/14/2018</a:t>
+              <a:t>2/22/2018</a:t>
             </a:fld>
             <a:endParaRPr lang="en-US" dirty="0"/>
           </a:p>
@@ -3479,7 +3479,7 @@
             <a:fld id="{87DE6118-2437-4B30-8E3C-4D2BE6020583}" type="datetimeFigureOut">
               <a:rPr lang="en-US" dirty="0"/>
               <a:pPr/>
-              <a:t>2/14/2018</a:t>
+              <a:t>2/22/2018</a:t>
             </a:fld>
             <a:endParaRPr lang="en-US" dirty="0"/>
           </a:p>
@@ -4980,7 +4980,7 @@
           <a:graphicData uri="http://schemas.openxmlformats.org/presentationml/2006/ole">
             <mc:AlternateContent xmlns:mc="http://schemas.openxmlformats.org/markup-compatibility/2006">
               <mc:Choice xmlns:v="urn:schemas-microsoft-com:vml" Requires="v">
-                <p:oleObj spid="_x0000_s1031" r:id="rId3" imgW="889000" imgH="431800" progId="Equation.3">
+                <p:oleObj spid="_x0000_s1032" r:id="rId3" imgW="889000" imgH="431800" progId="Equation.3">
                   <p:embed/>
                 </p:oleObj>
               </mc:Choice>
@@ -5371,7 +5371,7 @@
           <a:graphicData uri="http://schemas.openxmlformats.org/presentationml/2006/ole">
             <mc:AlternateContent xmlns:mc="http://schemas.openxmlformats.org/markup-compatibility/2006">
               <mc:Choice xmlns:v="urn:schemas-microsoft-com:vml" Requires="v">
-                <p:oleObj spid="_x0000_s2055" name="Equation" r:id="rId3" imgW="863622" imgH="432009" progId="Equation.3">
+                <p:oleObj spid="_x0000_s2056" name="Equation" r:id="rId3" imgW="863622" imgH="432009" progId="Equation.3">
                   <p:embed/>
                 </p:oleObj>
               </mc:Choice>
@@ -5754,7 +5754,7 @@
           <a:graphicData uri="http://schemas.openxmlformats.org/presentationml/2006/ole">
             <mc:AlternateContent xmlns:mc="http://schemas.openxmlformats.org/markup-compatibility/2006">
               <mc:Choice xmlns:v="urn:schemas-microsoft-com:vml" Requires="v">
-                <p:oleObj spid="_x0000_s3078" r:id="rId3" imgW="1066800" imgH="431800" progId="Equation.3">
+                <p:oleObj spid="_x0000_s3079" r:id="rId3" imgW="1066800" imgH="431800" progId="Equation.3">
                   <p:embed/>
                 </p:oleObj>
               </mc:Choice>

</xml_diff>